<commit_message>
ietf112-anima-jws-voucher.pdf - proposed slides for IETF112
</commit_message>
<xml_diff>
--- a/presentations/ietf112-anima-jws-voucher.pptx
+++ b/presentations/ietf112-anima-jws-voucher.pptx
@@ -227,7 +227,7 @@
           <a:p>
             <a:fld id="{33B5B5E8-CA78-4A82-83A0-867EF5A818AE}" type="datetimeFigureOut">
               <a:rPr lang="en-US" smtClean="0"/>
-              <a:t>11/3/2021</a:t>
+              <a:t>11/4/2021</a:t>
             </a:fld>
             <a:endParaRPr lang="en-US"/>
           </a:p>
@@ -985,7 +985,7 @@
           <a:p>
             <a:fld id="{8C792E63-5F21-4F54-A864-D84D9F273FCA}" type="datetimeFigureOut">
               <a:rPr lang="en-US" smtClean="0"/>
-              <a:t>11/3/2021</a:t>
+              <a:t>11/4/2021</a:t>
             </a:fld>
             <a:endParaRPr lang="en-US" dirty="0"/>
           </a:p>
@@ -1203,7 +1203,7 @@
           <a:p>
             <a:fld id="{8C792E63-5F21-4F54-A864-D84D9F273FCA}" type="datetimeFigureOut">
               <a:rPr lang="en-US" smtClean="0"/>
-              <a:t>11/3/2021</a:t>
+              <a:t>11/4/2021</a:t>
             </a:fld>
             <a:endParaRPr lang="en-US"/>
           </a:p>
@@ -1427,7 +1427,7 @@
           <a:p>
             <a:fld id="{8C792E63-5F21-4F54-A864-D84D9F273FCA}" type="datetimeFigureOut">
               <a:rPr lang="en-US" smtClean="0"/>
-              <a:t>11/3/2021</a:t>
+              <a:t>11/4/2021</a:t>
             </a:fld>
             <a:endParaRPr lang="en-US"/>
           </a:p>
@@ -1641,7 +1641,7 @@
           <a:p>
             <a:fld id="{8C792E63-5F21-4F54-A864-D84D9F273FCA}" type="datetimeFigureOut">
               <a:rPr lang="en-US" smtClean="0"/>
-              <a:t>11/3/2021</a:t>
+              <a:t>11/4/2021</a:t>
             </a:fld>
             <a:endParaRPr lang="en-US"/>
           </a:p>
@@ -1932,7 +1932,7 @@
           <a:p>
             <a:fld id="{8C792E63-5F21-4F54-A864-D84D9F273FCA}" type="datetimeFigureOut">
               <a:rPr lang="en-US" smtClean="0"/>
-              <a:t>11/3/2021</a:t>
+              <a:t>11/4/2021</a:t>
             </a:fld>
             <a:endParaRPr lang="en-US"/>
           </a:p>
@@ -2213,7 +2213,7 @@
           <a:p>
             <a:fld id="{8C792E63-5F21-4F54-A864-D84D9F273FCA}" type="datetimeFigureOut">
               <a:rPr lang="en-US" smtClean="0"/>
-              <a:t>11/3/2021</a:t>
+              <a:t>11/4/2021</a:t>
             </a:fld>
             <a:endParaRPr lang="en-US"/>
           </a:p>
@@ -2641,7 +2641,7 @@
           <a:p>
             <a:fld id="{8C792E63-5F21-4F54-A864-D84D9F273FCA}" type="datetimeFigureOut">
               <a:rPr lang="en-US" smtClean="0"/>
-              <a:t>11/3/2021</a:t>
+              <a:t>11/4/2021</a:t>
             </a:fld>
             <a:endParaRPr lang="en-US"/>
           </a:p>
@@ -2798,7 +2798,7 @@
           <a:p>
             <a:fld id="{8C792E63-5F21-4F54-A864-D84D9F273FCA}" type="datetimeFigureOut">
               <a:rPr lang="en-US" smtClean="0"/>
-              <a:t>11/3/2021</a:t>
+              <a:t>11/4/2021</a:t>
             </a:fld>
             <a:endParaRPr lang="en-US"/>
           </a:p>
@@ -2927,7 +2927,7 @@
           <a:p>
             <a:fld id="{8C792E63-5F21-4F54-A864-D84D9F273FCA}" type="datetimeFigureOut">
               <a:rPr lang="en-US" smtClean="0"/>
-              <a:t>11/3/2021</a:t>
+              <a:t>11/4/2021</a:t>
             </a:fld>
             <a:endParaRPr lang="en-US"/>
           </a:p>
@@ -3254,7 +3254,7 @@
           <a:p>
             <a:fld id="{8C792E63-5F21-4F54-A864-D84D9F273FCA}" type="datetimeFigureOut">
               <a:rPr lang="en-US" smtClean="0"/>
-              <a:t>11/3/2021</a:t>
+              <a:t>11/4/2021</a:t>
             </a:fld>
             <a:endParaRPr lang="en-US"/>
           </a:p>
@@ -3558,7 +3558,7 @@
           <a:p>
             <a:fld id="{8C792E63-5F21-4F54-A864-D84D9F273FCA}" type="datetimeFigureOut">
               <a:rPr lang="en-US" smtClean="0"/>
-              <a:t>11/3/2021</a:t>
+              <a:t>11/4/2021</a:t>
             </a:fld>
             <a:endParaRPr lang="en-US"/>
           </a:p>
@@ -3850,7 +3850,7 @@
           <a:p>
             <a:fld id="{8C792E63-5F21-4F54-A864-D84D9F273FCA}" type="datetimeFigureOut">
               <a:rPr lang="en-US" smtClean="0"/>
-              <a:t>11/3/2021</a:t>
+              <a:t>11/4/2021</a:t>
             </a:fld>
             <a:endParaRPr lang="en-US"/>
           </a:p>
@@ -4630,7 +4630,7 @@
             <a:fld id="{8C792E63-5F21-4F54-A864-D84D9F273FCA}" type="datetimeFigureOut">
               <a:rPr lang="en-US" smtClean="0"/>
               <a:pPr/>
-              <a:t>11/3/2021</a:t>
+              <a:t>11/4/2021</a:t>
             </a:fld>
             <a:endParaRPr lang="en-US"/>
           </a:p>
@@ -5138,7 +5138,7 @@
             <a:fld id="{8C792E63-5F21-4F54-A864-D84D9F273FCA}" type="datetimeFigureOut">
               <a:rPr lang="en-US" smtClean="0"/>
               <a:pPr/>
-              <a:t>11/3/2021</a:t>
+              <a:t>11/4/2021</a:t>
             </a:fld>
             <a:endParaRPr lang="en-US" dirty="0"/>
           </a:p>
@@ -5650,7 +5650,7 @@
             <a:fld id="{8C792E63-5F21-4F54-A864-D84D9F273FCA}" type="datetimeFigureOut">
               <a:rPr lang="en-US" smtClean="0"/>
               <a:pPr/>
-              <a:t>11/3/2021</a:t>
+              <a:t>11/4/2021</a:t>
             </a:fld>
             <a:endParaRPr lang="en-US" dirty="0"/>
           </a:p>
@@ -5903,7 +5903,7 @@
             </a:r>
             <a:r>
               <a:rPr lang="en-US" sz="2200" dirty="0"/>
-              <a:t> JWS serialization option: </a:t>
+              <a:t> JWS serialization option </a:t>
             </a:r>
           </a:p>
           <a:p>
@@ -6076,7 +6076,7 @@
             <a:fld id="{8C792E63-5F21-4F54-A864-D84D9F273FCA}" type="datetimeFigureOut">
               <a:rPr lang="en-US" smtClean="0"/>
               <a:pPr/>
-              <a:t>11/3/2021</a:t>
+              <a:t>11/4/2021</a:t>
             </a:fld>
             <a:endParaRPr lang="en-US" dirty="0"/>
           </a:p>

</xml_diff>